<commit_message>
This version sent to Clemens for his suggestions
</commit_message>
<xml_diff>
--- a/mof release figure/mof release figure.pptx
+++ b/mof release figure/mof release figure.pptx
@@ -2,19 +2,19 @@
 <file path=ppt/presentation.xml><?xml version="1.0" encoding="utf-8"?>
 <p:presentation xmlns:a="http://schemas.openxmlformats.org/drawingml/2006/main" xmlns:r="http://schemas.openxmlformats.org/officeDocument/2006/relationships" xmlns:p="http://schemas.openxmlformats.org/presentationml/2006/main" saveSubsetFonts="1">
   <p:sldMasterIdLst>
-    <p:sldMasterId id="2147483660" r:id="rId1"/>
+    <p:sldMasterId id="2147483672" r:id="rId1"/>
   </p:sldMasterIdLst>
   <p:sldIdLst>
     <p:sldId id="256" r:id="rId2"/>
   </p:sldIdLst>
-  <p:sldSz cx="21599525" cy="7199313"/>
+  <p:sldSz cx="21599525" cy="7920038"/>
   <p:notesSz cx="6858000" cy="9144000"/>
   <p:defaultTextStyle>
     <a:defPPr>
       <a:defRPr lang="en-US"/>
     </a:defPPr>
-    <a:lvl1pPr marL="0" algn="l" defTabSz="1382298" rtl="0" eaLnBrk="1" latinLnBrk="0" hangingPunct="1">
-      <a:defRPr sz="2721" kern="1200">
+    <a:lvl1pPr marL="0" algn="l" defTabSz="457200" rtl="0" eaLnBrk="1" latinLnBrk="0" hangingPunct="1">
+      <a:defRPr sz="1800" kern="1200">
         <a:solidFill>
           <a:schemeClr val="tx1"/>
         </a:solidFill>
@@ -23,8 +23,8 @@
         <a:cs typeface="+mn-cs"/>
       </a:defRPr>
     </a:lvl1pPr>
-    <a:lvl2pPr marL="691149" algn="l" defTabSz="1382298" rtl="0" eaLnBrk="1" latinLnBrk="0" hangingPunct="1">
-      <a:defRPr sz="2721" kern="1200">
+    <a:lvl2pPr marL="457200" algn="l" defTabSz="457200" rtl="0" eaLnBrk="1" latinLnBrk="0" hangingPunct="1">
+      <a:defRPr sz="1800" kern="1200">
         <a:solidFill>
           <a:schemeClr val="tx1"/>
         </a:solidFill>
@@ -33,8 +33,8 @@
         <a:cs typeface="+mn-cs"/>
       </a:defRPr>
     </a:lvl2pPr>
-    <a:lvl3pPr marL="1382298" algn="l" defTabSz="1382298" rtl="0" eaLnBrk="1" latinLnBrk="0" hangingPunct="1">
-      <a:defRPr sz="2721" kern="1200">
+    <a:lvl3pPr marL="914400" algn="l" defTabSz="457200" rtl="0" eaLnBrk="1" latinLnBrk="0" hangingPunct="1">
+      <a:defRPr sz="1800" kern="1200">
         <a:solidFill>
           <a:schemeClr val="tx1"/>
         </a:solidFill>
@@ -43,8 +43,8 @@
         <a:cs typeface="+mn-cs"/>
       </a:defRPr>
     </a:lvl3pPr>
-    <a:lvl4pPr marL="2073448" algn="l" defTabSz="1382298" rtl="0" eaLnBrk="1" latinLnBrk="0" hangingPunct="1">
-      <a:defRPr sz="2721" kern="1200">
+    <a:lvl4pPr marL="1371600" algn="l" defTabSz="457200" rtl="0" eaLnBrk="1" latinLnBrk="0" hangingPunct="1">
+      <a:defRPr sz="1800" kern="1200">
         <a:solidFill>
           <a:schemeClr val="tx1"/>
         </a:solidFill>
@@ -53,8 +53,8 @@
         <a:cs typeface="+mn-cs"/>
       </a:defRPr>
     </a:lvl4pPr>
-    <a:lvl5pPr marL="2764597" algn="l" defTabSz="1382298" rtl="0" eaLnBrk="1" latinLnBrk="0" hangingPunct="1">
-      <a:defRPr sz="2721" kern="1200">
+    <a:lvl5pPr marL="1828800" algn="l" defTabSz="457200" rtl="0" eaLnBrk="1" latinLnBrk="0" hangingPunct="1">
+      <a:defRPr sz="1800" kern="1200">
         <a:solidFill>
           <a:schemeClr val="tx1"/>
         </a:solidFill>
@@ -63,8 +63,8 @@
         <a:cs typeface="+mn-cs"/>
       </a:defRPr>
     </a:lvl5pPr>
-    <a:lvl6pPr marL="3455746" algn="l" defTabSz="1382298" rtl="0" eaLnBrk="1" latinLnBrk="0" hangingPunct="1">
-      <a:defRPr sz="2721" kern="1200">
+    <a:lvl6pPr marL="2286000" algn="l" defTabSz="457200" rtl="0" eaLnBrk="1" latinLnBrk="0" hangingPunct="1">
+      <a:defRPr sz="1800" kern="1200">
         <a:solidFill>
           <a:schemeClr val="tx1"/>
         </a:solidFill>
@@ -73,8 +73,8 @@
         <a:cs typeface="+mn-cs"/>
       </a:defRPr>
     </a:lvl6pPr>
-    <a:lvl7pPr marL="4146895" algn="l" defTabSz="1382298" rtl="0" eaLnBrk="1" latinLnBrk="0" hangingPunct="1">
-      <a:defRPr sz="2721" kern="1200">
+    <a:lvl7pPr marL="2743200" algn="l" defTabSz="457200" rtl="0" eaLnBrk="1" latinLnBrk="0" hangingPunct="1">
+      <a:defRPr sz="1800" kern="1200">
         <a:solidFill>
           <a:schemeClr val="tx1"/>
         </a:solidFill>
@@ -83,8 +83,8 @@
         <a:cs typeface="+mn-cs"/>
       </a:defRPr>
     </a:lvl7pPr>
-    <a:lvl8pPr marL="4838045" algn="l" defTabSz="1382298" rtl="0" eaLnBrk="1" latinLnBrk="0" hangingPunct="1">
-      <a:defRPr sz="2721" kern="1200">
+    <a:lvl8pPr marL="3200400" algn="l" defTabSz="457200" rtl="0" eaLnBrk="1" latinLnBrk="0" hangingPunct="1">
+      <a:defRPr sz="1800" kern="1200">
         <a:solidFill>
           <a:schemeClr val="tx1"/>
         </a:solidFill>
@@ -93,8 +93,8 @@
         <a:cs typeface="+mn-cs"/>
       </a:defRPr>
     </a:lvl8pPr>
-    <a:lvl9pPr marL="5529194" algn="l" defTabSz="1382298" rtl="0" eaLnBrk="1" latinLnBrk="0" hangingPunct="1">
-      <a:defRPr sz="2721" kern="1200">
+    <a:lvl9pPr marL="3657600" algn="l" defTabSz="457200" rtl="0" eaLnBrk="1" latinLnBrk="0" hangingPunct="1">
+      <a:defRPr sz="1800" kern="1200">
         <a:solidFill>
           <a:schemeClr val="tx1"/>
         </a:solidFill>
@@ -851,7 +851,6 @@
               </a:p>
             </c:rich>
           </c:tx>
-          <c:layout/>
           <c:overlay val="0"/>
           <c:spPr>
             <a:noFill/>
@@ -956,7 +955,6 @@
               </a:p>
             </c:rich>
           </c:tx>
-          <c:layout/>
           <c:overlay val="0"/>
           <c:spPr>
             <a:noFill/>
@@ -1839,7 +1837,6 @@
               </a:p>
             </c:rich>
           </c:tx>
-          <c:layout/>
           <c:overlay val="0"/>
           <c:spPr>
             <a:noFill/>
@@ -2773,7 +2770,6 @@
               </a:p>
             </c:rich>
           </c:tx>
-          <c:layout/>
           <c:overlay val="0"/>
           <c:spPr>
             <a:noFill/>
@@ -4665,20 +4661,20 @@
         </p:nvSpPr>
         <p:spPr>
           <a:xfrm>
-            <a:off x="2699941" y="1178222"/>
-            <a:ext cx="16199644" cy="2506427"/>
+            <a:off x="2699941" y="1296173"/>
+            <a:ext cx="16199644" cy="2757347"/>
           </a:xfrm>
         </p:spPr>
         <p:txBody>
           <a:bodyPr anchor="b"/>
           <a:lstStyle>
             <a:lvl1pPr algn="ctr">
-              <a:defRPr sz="6299"/>
+              <a:defRPr sz="6929"/>
             </a:lvl1pPr>
           </a:lstStyle>
           <a:p>
             <a:r>
-              <a:rPr lang="en-US" smtClean="0"/>
+              <a:rPr lang="en-US"/>
               <a:t>Click to edit Master title style</a:t>
             </a:r>
             <a:endParaRPr lang="en-US" dirty="0"/>
@@ -4697,8 +4693,8 @@
         </p:nvSpPr>
         <p:spPr>
           <a:xfrm>
-            <a:off x="2699941" y="3781306"/>
-            <a:ext cx="16199644" cy="1738167"/>
+            <a:off x="2699941" y="4159854"/>
+            <a:ext cx="16199644" cy="1912175"/>
           </a:xfrm>
         </p:spPr>
         <p:txBody>
@@ -4706,44 +4702,44 @@
           <a:lstStyle>
             <a:lvl1pPr marL="0" indent="0" algn="ctr">
               <a:buNone/>
-              <a:defRPr sz="2520"/>
+              <a:defRPr sz="2772"/>
             </a:lvl1pPr>
-            <a:lvl2pPr marL="479969" indent="0" algn="ctr">
+            <a:lvl2pPr marL="528020" indent="0" algn="ctr">
               <a:buNone/>
-              <a:defRPr sz="2100"/>
+              <a:defRPr sz="2310"/>
             </a:lvl2pPr>
-            <a:lvl3pPr marL="959937" indent="0" algn="ctr">
+            <a:lvl3pPr marL="1056041" indent="0" algn="ctr">
               <a:buNone/>
-              <a:defRPr sz="1890"/>
+              <a:defRPr sz="2079"/>
             </a:lvl3pPr>
-            <a:lvl4pPr marL="1439906" indent="0" algn="ctr">
+            <a:lvl4pPr marL="1584061" indent="0" algn="ctr">
               <a:buNone/>
-              <a:defRPr sz="1680"/>
+              <a:defRPr sz="1848"/>
             </a:lvl4pPr>
-            <a:lvl5pPr marL="1919874" indent="0" algn="ctr">
+            <a:lvl5pPr marL="2112081" indent="0" algn="ctr">
               <a:buNone/>
-              <a:defRPr sz="1680"/>
+              <a:defRPr sz="1848"/>
             </a:lvl5pPr>
-            <a:lvl6pPr marL="2399843" indent="0" algn="ctr">
+            <a:lvl6pPr marL="2640101" indent="0" algn="ctr">
               <a:buNone/>
-              <a:defRPr sz="1680"/>
+              <a:defRPr sz="1848"/>
             </a:lvl6pPr>
-            <a:lvl7pPr marL="2879811" indent="0" algn="ctr">
+            <a:lvl7pPr marL="3168122" indent="0" algn="ctr">
               <a:buNone/>
-              <a:defRPr sz="1680"/>
+              <a:defRPr sz="1848"/>
             </a:lvl7pPr>
-            <a:lvl8pPr marL="3359780" indent="0" algn="ctr">
+            <a:lvl8pPr marL="3696142" indent="0" algn="ctr">
               <a:buNone/>
-              <a:defRPr sz="1680"/>
+              <a:defRPr sz="1848"/>
             </a:lvl8pPr>
-            <a:lvl9pPr marL="3839748" indent="0" algn="ctr">
+            <a:lvl9pPr marL="4224162" indent="0" algn="ctr">
               <a:buNone/>
-              <a:defRPr sz="1680"/>
+              <a:defRPr sz="1848"/>
             </a:lvl9pPr>
           </a:lstStyle>
           <a:p>
             <a:r>
-              <a:rPr lang="en-US" smtClean="0"/>
+              <a:rPr lang="en-US"/>
               <a:t>Click to edit Master subtitle style</a:t>
             </a:r>
             <a:endParaRPr lang="en-US" dirty="0"/>
@@ -4767,7 +4763,7 @@
           <a:p>
             <a:fld id="{A7C64783-50C8-4BC2-AC3B-DB97829B1D6E}" type="datetimeFigureOut">
               <a:rPr lang="en-GB" smtClean="0"/>
-              <a:t>29/08/2018</a:t>
+              <a:t>22/10/2018</a:t>
             </a:fld>
             <a:endParaRPr lang="en-GB"/>
           </a:p>
@@ -4818,7 +4814,7 @@
     </p:spTree>
     <p:extLst>
       <p:ext uri="{BB962C8B-B14F-4D97-AF65-F5344CB8AC3E}">
-        <p14:creationId xmlns:p14="http://schemas.microsoft.com/office/powerpoint/2010/main" val="3891059643"/>
+        <p14:creationId xmlns:p14="http://schemas.microsoft.com/office/powerpoint/2010/main" val="3359628322"/>
       </p:ext>
     </p:extLst>
   </p:cSld>
@@ -4861,7 +4857,7 @@
           <a:lstStyle/>
           <a:p>
             <a:r>
-              <a:rPr lang="en-US" smtClean="0"/>
+              <a:rPr lang="en-US"/>
               <a:t>Click to edit Master title style</a:t>
             </a:r>
             <a:endParaRPr lang="en-US" dirty="0"/>
@@ -4885,35 +4881,35 @@
           <a:p>
             <a:pPr lvl="0"/>
             <a:r>
-              <a:rPr lang="en-US" smtClean="0"/>
+              <a:rPr lang="en-US"/>
               <a:t>Edit Master text styles</a:t>
             </a:r>
           </a:p>
           <a:p>
             <a:pPr lvl="1"/>
             <a:r>
-              <a:rPr lang="en-US" smtClean="0"/>
+              <a:rPr lang="en-US"/>
               <a:t>Second level</a:t>
             </a:r>
           </a:p>
           <a:p>
             <a:pPr lvl="2"/>
             <a:r>
-              <a:rPr lang="en-US" smtClean="0"/>
+              <a:rPr lang="en-US"/>
               <a:t>Third level</a:t>
             </a:r>
           </a:p>
           <a:p>
             <a:pPr lvl="3"/>
             <a:r>
-              <a:rPr lang="en-US" smtClean="0"/>
+              <a:rPr lang="en-US"/>
               <a:t>Fourth level</a:t>
             </a:r>
           </a:p>
           <a:p>
             <a:pPr lvl="4"/>
             <a:r>
-              <a:rPr lang="en-US" smtClean="0"/>
+              <a:rPr lang="en-US"/>
               <a:t>Fifth level</a:t>
             </a:r>
             <a:endParaRPr lang="en-US" dirty="0"/>
@@ -4937,7 +4933,7 @@
           <a:p>
             <a:fld id="{A7C64783-50C8-4BC2-AC3B-DB97829B1D6E}" type="datetimeFigureOut">
               <a:rPr lang="en-GB" smtClean="0"/>
-              <a:t>29/08/2018</a:t>
+              <a:t>22/10/2018</a:t>
             </a:fld>
             <a:endParaRPr lang="en-GB"/>
           </a:p>
@@ -4988,7 +4984,7 @@
     </p:spTree>
     <p:extLst>
       <p:ext uri="{BB962C8B-B14F-4D97-AF65-F5344CB8AC3E}">
-        <p14:creationId xmlns:p14="http://schemas.microsoft.com/office/powerpoint/2010/main" val="60185433"/>
+        <p14:creationId xmlns:p14="http://schemas.microsoft.com/office/powerpoint/2010/main" val="344433208"/>
       </p:ext>
     </p:extLst>
   </p:cSld>
@@ -5027,8 +5023,8 @@
         </p:nvSpPr>
         <p:spPr>
           <a:xfrm>
-            <a:off x="15457160" y="383297"/>
-            <a:ext cx="4657398" cy="6101085"/>
+            <a:off x="15457160" y="421669"/>
+            <a:ext cx="4657398" cy="6711866"/>
           </a:xfrm>
         </p:spPr>
         <p:txBody>
@@ -5036,7 +5032,7 @@
           <a:lstStyle/>
           <a:p>
             <a:r>
-              <a:rPr lang="en-US" smtClean="0"/>
+              <a:rPr lang="en-US"/>
               <a:t>Click to edit Master title style</a:t>
             </a:r>
             <a:endParaRPr lang="en-US" dirty="0"/>
@@ -5055,8 +5051,8 @@
         </p:nvSpPr>
         <p:spPr>
           <a:xfrm>
-            <a:off x="1484967" y="383297"/>
-            <a:ext cx="13702199" cy="6101085"/>
+            <a:off x="1484967" y="421669"/>
+            <a:ext cx="13702199" cy="6711866"/>
           </a:xfrm>
         </p:spPr>
         <p:txBody>
@@ -5065,35 +5061,35 @@
           <a:p>
             <a:pPr lvl="0"/>
             <a:r>
-              <a:rPr lang="en-US" smtClean="0"/>
+              <a:rPr lang="en-US"/>
               <a:t>Edit Master text styles</a:t>
             </a:r>
           </a:p>
           <a:p>
             <a:pPr lvl="1"/>
             <a:r>
-              <a:rPr lang="en-US" smtClean="0"/>
+              <a:rPr lang="en-US"/>
               <a:t>Second level</a:t>
             </a:r>
           </a:p>
           <a:p>
             <a:pPr lvl="2"/>
             <a:r>
-              <a:rPr lang="en-US" smtClean="0"/>
+              <a:rPr lang="en-US"/>
               <a:t>Third level</a:t>
             </a:r>
           </a:p>
           <a:p>
             <a:pPr lvl="3"/>
             <a:r>
-              <a:rPr lang="en-US" smtClean="0"/>
+              <a:rPr lang="en-US"/>
               <a:t>Fourth level</a:t>
             </a:r>
           </a:p>
           <a:p>
             <a:pPr lvl="4"/>
             <a:r>
-              <a:rPr lang="en-US" smtClean="0"/>
+              <a:rPr lang="en-US"/>
               <a:t>Fifth level</a:t>
             </a:r>
             <a:endParaRPr lang="en-US" dirty="0"/>
@@ -5117,7 +5113,7 @@
           <a:p>
             <a:fld id="{A7C64783-50C8-4BC2-AC3B-DB97829B1D6E}" type="datetimeFigureOut">
               <a:rPr lang="en-GB" smtClean="0"/>
-              <a:t>29/08/2018</a:t>
+              <a:t>22/10/2018</a:t>
             </a:fld>
             <a:endParaRPr lang="en-GB"/>
           </a:p>
@@ -5168,7 +5164,7 @@
     </p:spTree>
     <p:extLst>
       <p:ext uri="{BB962C8B-B14F-4D97-AF65-F5344CB8AC3E}">
-        <p14:creationId xmlns:p14="http://schemas.microsoft.com/office/powerpoint/2010/main" val="4023648113"/>
+        <p14:creationId xmlns:p14="http://schemas.microsoft.com/office/powerpoint/2010/main" val="1440529407"/>
       </p:ext>
     </p:extLst>
   </p:cSld>
@@ -5211,7 +5207,7 @@
           <a:lstStyle/>
           <a:p>
             <a:r>
-              <a:rPr lang="en-US" smtClean="0"/>
+              <a:rPr lang="en-US"/>
               <a:t>Click to edit Master title style</a:t>
             </a:r>
             <a:endParaRPr lang="en-US" dirty="0"/>
@@ -5235,35 +5231,35 @@
           <a:p>
             <a:pPr lvl="0"/>
             <a:r>
-              <a:rPr lang="en-US" smtClean="0"/>
+              <a:rPr lang="en-US"/>
               <a:t>Edit Master text styles</a:t>
             </a:r>
           </a:p>
           <a:p>
             <a:pPr lvl="1"/>
             <a:r>
-              <a:rPr lang="en-US" smtClean="0"/>
+              <a:rPr lang="en-US"/>
               <a:t>Second level</a:t>
             </a:r>
           </a:p>
           <a:p>
             <a:pPr lvl="2"/>
             <a:r>
-              <a:rPr lang="en-US" smtClean="0"/>
+              <a:rPr lang="en-US"/>
               <a:t>Third level</a:t>
             </a:r>
           </a:p>
           <a:p>
             <a:pPr lvl="3"/>
             <a:r>
-              <a:rPr lang="en-US" smtClean="0"/>
+              <a:rPr lang="en-US"/>
               <a:t>Fourth level</a:t>
             </a:r>
           </a:p>
           <a:p>
             <a:pPr lvl="4"/>
             <a:r>
-              <a:rPr lang="en-US" smtClean="0"/>
+              <a:rPr lang="en-US"/>
               <a:t>Fifth level</a:t>
             </a:r>
             <a:endParaRPr lang="en-US" dirty="0"/>
@@ -5287,7 +5283,7 @@
           <a:p>
             <a:fld id="{A7C64783-50C8-4BC2-AC3B-DB97829B1D6E}" type="datetimeFigureOut">
               <a:rPr lang="en-GB" smtClean="0"/>
-              <a:t>29/08/2018</a:t>
+              <a:t>22/10/2018</a:t>
             </a:fld>
             <a:endParaRPr lang="en-GB"/>
           </a:p>
@@ -5338,7 +5334,7 @@
     </p:spTree>
     <p:extLst>
       <p:ext uri="{BB962C8B-B14F-4D97-AF65-F5344CB8AC3E}">
-        <p14:creationId xmlns:p14="http://schemas.microsoft.com/office/powerpoint/2010/main" val="827055116"/>
+        <p14:creationId xmlns:p14="http://schemas.microsoft.com/office/powerpoint/2010/main" val="4290926473"/>
       </p:ext>
     </p:extLst>
   </p:cSld>
@@ -5377,20 +5373,20 @@
         </p:nvSpPr>
         <p:spPr>
           <a:xfrm>
-            <a:off x="1473718" y="1794830"/>
-            <a:ext cx="18629590" cy="2994714"/>
+            <a:off x="1473718" y="1974511"/>
+            <a:ext cx="18629590" cy="3294515"/>
           </a:xfrm>
         </p:spPr>
         <p:txBody>
           <a:bodyPr anchor="b"/>
           <a:lstStyle>
             <a:lvl1pPr>
-              <a:defRPr sz="6299"/>
+              <a:defRPr sz="6929"/>
             </a:lvl1pPr>
           </a:lstStyle>
           <a:p>
             <a:r>
-              <a:rPr lang="en-US" smtClean="0"/>
+              <a:rPr lang="en-US"/>
               <a:t>Click to edit Master title style</a:t>
             </a:r>
             <a:endParaRPr lang="en-US" dirty="0"/>
@@ -5409,8 +5405,8 @@
         </p:nvSpPr>
         <p:spPr>
           <a:xfrm>
-            <a:off x="1473718" y="4817875"/>
-            <a:ext cx="18629590" cy="1574849"/>
+            <a:off x="1473718" y="5300193"/>
+            <a:ext cx="18629590" cy="1732508"/>
           </a:xfrm>
         </p:spPr>
         <p:txBody>
@@ -5418,7 +5414,7 @@
           <a:lstStyle>
             <a:lvl1pPr marL="0" indent="0">
               <a:buNone/>
-              <a:defRPr sz="2520">
+              <a:defRPr sz="2772">
                 <a:solidFill>
                   <a:schemeClr val="tx1">
                     <a:tint val="75000"/>
@@ -5426,9 +5422,9 @@
                 </a:solidFill>
               </a:defRPr>
             </a:lvl1pPr>
-            <a:lvl2pPr marL="479969" indent="0">
+            <a:lvl2pPr marL="528020" indent="0">
               <a:buNone/>
-              <a:defRPr sz="2100">
+              <a:defRPr sz="2310">
                 <a:solidFill>
                   <a:schemeClr val="tx1">
                     <a:tint val="75000"/>
@@ -5436,9 +5432,9 @@
                 </a:solidFill>
               </a:defRPr>
             </a:lvl2pPr>
-            <a:lvl3pPr marL="959937" indent="0">
+            <a:lvl3pPr marL="1056041" indent="0">
               <a:buNone/>
-              <a:defRPr sz="1890">
+              <a:defRPr sz="2079">
                 <a:solidFill>
                   <a:schemeClr val="tx1">
                     <a:tint val="75000"/>
@@ -5446,9 +5442,9 @@
                 </a:solidFill>
               </a:defRPr>
             </a:lvl3pPr>
-            <a:lvl4pPr marL="1439906" indent="0">
+            <a:lvl4pPr marL="1584061" indent="0">
               <a:buNone/>
-              <a:defRPr sz="1680">
+              <a:defRPr sz="1848">
                 <a:solidFill>
                   <a:schemeClr val="tx1">
                     <a:tint val="75000"/>
@@ -5456,9 +5452,9 @@
                 </a:solidFill>
               </a:defRPr>
             </a:lvl4pPr>
-            <a:lvl5pPr marL="1919874" indent="0">
+            <a:lvl5pPr marL="2112081" indent="0">
               <a:buNone/>
-              <a:defRPr sz="1680">
+              <a:defRPr sz="1848">
                 <a:solidFill>
                   <a:schemeClr val="tx1">
                     <a:tint val="75000"/>
@@ -5466,9 +5462,9 @@
                 </a:solidFill>
               </a:defRPr>
             </a:lvl5pPr>
-            <a:lvl6pPr marL="2399843" indent="0">
+            <a:lvl6pPr marL="2640101" indent="0">
               <a:buNone/>
-              <a:defRPr sz="1680">
+              <a:defRPr sz="1848">
                 <a:solidFill>
                   <a:schemeClr val="tx1">
                     <a:tint val="75000"/>
@@ -5476,9 +5472,9 @@
                 </a:solidFill>
               </a:defRPr>
             </a:lvl6pPr>
-            <a:lvl7pPr marL="2879811" indent="0">
+            <a:lvl7pPr marL="3168122" indent="0">
               <a:buNone/>
-              <a:defRPr sz="1680">
+              <a:defRPr sz="1848">
                 <a:solidFill>
                   <a:schemeClr val="tx1">
                     <a:tint val="75000"/>
@@ -5486,9 +5482,9 @@
                 </a:solidFill>
               </a:defRPr>
             </a:lvl7pPr>
-            <a:lvl8pPr marL="3359780" indent="0">
+            <a:lvl8pPr marL="3696142" indent="0">
               <a:buNone/>
-              <a:defRPr sz="1680">
+              <a:defRPr sz="1848">
                 <a:solidFill>
                   <a:schemeClr val="tx1">
                     <a:tint val="75000"/>
@@ -5496,9 +5492,9 @@
                 </a:solidFill>
               </a:defRPr>
             </a:lvl8pPr>
-            <a:lvl9pPr marL="3839748" indent="0">
+            <a:lvl9pPr marL="4224162" indent="0">
               <a:buNone/>
-              <a:defRPr sz="1680">
+              <a:defRPr sz="1848">
                 <a:solidFill>
                   <a:schemeClr val="tx1">
                     <a:tint val="75000"/>
@@ -5510,7 +5506,7 @@
           <a:p>
             <a:pPr lvl="0"/>
             <a:r>
-              <a:rPr lang="en-US" smtClean="0"/>
+              <a:rPr lang="en-US"/>
               <a:t>Edit Master text styles</a:t>
             </a:r>
           </a:p>
@@ -5533,7 +5529,7 @@
           <a:p>
             <a:fld id="{A7C64783-50C8-4BC2-AC3B-DB97829B1D6E}" type="datetimeFigureOut">
               <a:rPr lang="en-GB" smtClean="0"/>
-              <a:t>29/08/2018</a:t>
+              <a:t>22/10/2018</a:t>
             </a:fld>
             <a:endParaRPr lang="en-GB"/>
           </a:p>
@@ -5584,7 +5580,7 @@
     </p:spTree>
     <p:extLst>
       <p:ext uri="{BB962C8B-B14F-4D97-AF65-F5344CB8AC3E}">
-        <p14:creationId xmlns:p14="http://schemas.microsoft.com/office/powerpoint/2010/main" val="555306838"/>
+        <p14:creationId xmlns:p14="http://schemas.microsoft.com/office/powerpoint/2010/main" val="2792037459"/>
       </p:ext>
     </p:extLst>
   </p:cSld>
@@ -5627,7 +5623,7 @@
           <a:lstStyle/>
           <a:p>
             <a:r>
-              <a:rPr lang="en-US" smtClean="0"/>
+              <a:rPr lang="en-US"/>
               <a:t>Click to edit Master title style</a:t>
             </a:r>
             <a:endParaRPr lang="en-US" dirty="0"/>
@@ -5646,8 +5642,8 @@
         </p:nvSpPr>
         <p:spPr>
           <a:xfrm>
-            <a:off x="1484967" y="1916484"/>
-            <a:ext cx="9179798" cy="4567898"/>
+            <a:off x="1484967" y="2108344"/>
+            <a:ext cx="9179798" cy="5025191"/>
           </a:xfrm>
         </p:spPr>
         <p:txBody>
@@ -5656,35 +5652,35 @@
           <a:p>
             <a:pPr lvl="0"/>
             <a:r>
-              <a:rPr lang="en-US" smtClean="0"/>
+              <a:rPr lang="en-US"/>
               <a:t>Edit Master text styles</a:t>
             </a:r>
           </a:p>
           <a:p>
             <a:pPr lvl="1"/>
             <a:r>
-              <a:rPr lang="en-US" smtClean="0"/>
+              <a:rPr lang="en-US"/>
               <a:t>Second level</a:t>
             </a:r>
           </a:p>
           <a:p>
             <a:pPr lvl="2"/>
             <a:r>
-              <a:rPr lang="en-US" smtClean="0"/>
+              <a:rPr lang="en-US"/>
               <a:t>Third level</a:t>
             </a:r>
           </a:p>
           <a:p>
             <a:pPr lvl="3"/>
             <a:r>
-              <a:rPr lang="en-US" smtClean="0"/>
+              <a:rPr lang="en-US"/>
               <a:t>Fourth level</a:t>
             </a:r>
           </a:p>
           <a:p>
             <a:pPr lvl="4"/>
             <a:r>
-              <a:rPr lang="en-US" smtClean="0"/>
+              <a:rPr lang="en-US"/>
               <a:t>Fifth level</a:t>
             </a:r>
             <a:endParaRPr lang="en-US" dirty="0"/>
@@ -5703,8 +5699,8 @@
         </p:nvSpPr>
         <p:spPr>
           <a:xfrm>
-            <a:off x="10934760" y="1916484"/>
-            <a:ext cx="9179798" cy="4567898"/>
+            <a:off x="10934760" y="2108344"/>
+            <a:ext cx="9179798" cy="5025191"/>
           </a:xfrm>
         </p:spPr>
         <p:txBody>
@@ -5713,35 +5709,35 @@
           <a:p>
             <a:pPr lvl="0"/>
             <a:r>
-              <a:rPr lang="en-US" smtClean="0"/>
+              <a:rPr lang="en-US"/>
               <a:t>Edit Master text styles</a:t>
             </a:r>
           </a:p>
           <a:p>
             <a:pPr lvl="1"/>
             <a:r>
-              <a:rPr lang="en-US" smtClean="0"/>
+              <a:rPr lang="en-US"/>
               <a:t>Second level</a:t>
             </a:r>
           </a:p>
           <a:p>
             <a:pPr lvl="2"/>
             <a:r>
-              <a:rPr lang="en-US" smtClean="0"/>
+              <a:rPr lang="en-US"/>
               <a:t>Third level</a:t>
             </a:r>
           </a:p>
           <a:p>
             <a:pPr lvl="3"/>
             <a:r>
-              <a:rPr lang="en-US" smtClean="0"/>
+              <a:rPr lang="en-US"/>
               <a:t>Fourth level</a:t>
             </a:r>
           </a:p>
           <a:p>
             <a:pPr lvl="4"/>
             <a:r>
-              <a:rPr lang="en-US" smtClean="0"/>
+              <a:rPr lang="en-US"/>
               <a:t>Fifth level</a:t>
             </a:r>
             <a:endParaRPr lang="en-US" dirty="0"/>
@@ -5765,7 +5761,7 @@
           <a:p>
             <a:fld id="{A7C64783-50C8-4BC2-AC3B-DB97829B1D6E}" type="datetimeFigureOut">
               <a:rPr lang="en-GB" smtClean="0"/>
-              <a:t>29/08/2018</a:t>
+              <a:t>22/10/2018</a:t>
             </a:fld>
             <a:endParaRPr lang="en-GB"/>
           </a:p>
@@ -5816,7 +5812,7 @@
     </p:spTree>
     <p:extLst>
       <p:ext uri="{BB962C8B-B14F-4D97-AF65-F5344CB8AC3E}">
-        <p14:creationId xmlns:p14="http://schemas.microsoft.com/office/powerpoint/2010/main" val="2145097233"/>
+        <p14:creationId xmlns:p14="http://schemas.microsoft.com/office/powerpoint/2010/main" val="3446592773"/>
       </p:ext>
     </p:extLst>
   </p:cSld>
@@ -5855,8 +5851,8 @@
         </p:nvSpPr>
         <p:spPr>
           <a:xfrm>
-            <a:off x="1487781" y="383297"/>
-            <a:ext cx="18629590" cy="1391534"/>
+            <a:off x="1487781" y="421669"/>
+            <a:ext cx="18629590" cy="1530841"/>
           </a:xfrm>
         </p:spPr>
         <p:txBody>
@@ -5864,7 +5860,7 @@
           <a:lstStyle/>
           <a:p>
             <a:r>
-              <a:rPr lang="en-US" smtClean="0"/>
+              <a:rPr lang="en-US"/>
               <a:t>Click to edit Master title style</a:t>
             </a:r>
             <a:endParaRPr lang="en-US" dirty="0"/>
@@ -5883,8 +5879,8 @@
         </p:nvSpPr>
         <p:spPr>
           <a:xfrm>
-            <a:off x="1487781" y="1764832"/>
-            <a:ext cx="9137611" cy="864917"/>
+            <a:off x="1487781" y="1941510"/>
+            <a:ext cx="9137611" cy="951504"/>
           </a:xfrm>
         </p:spPr>
         <p:txBody>
@@ -5892,45 +5888,45 @@
           <a:lstStyle>
             <a:lvl1pPr marL="0" indent="0">
               <a:buNone/>
-              <a:defRPr sz="2520" b="1"/>
+              <a:defRPr sz="2772" b="1"/>
             </a:lvl1pPr>
-            <a:lvl2pPr marL="479969" indent="0">
+            <a:lvl2pPr marL="528020" indent="0">
               <a:buNone/>
-              <a:defRPr sz="2100" b="1"/>
+              <a:defRPr sz="2310" b="1"/>
             </a:lvl2pPr>
-            <a:lvl3pPr marL="959937" indent="0">
+            <a:lvl3pPr marL="1056041" indent="0">
               <a:buNone/>
-              <a:defRPr sz="1890" b="1"/>
+              <a:defRPr sz="2079" b="1"/>
             </a:lvl3pPr>
-            <a:lvl4pPr marL="1439906" indent="0">
+            <a:lvl4pPr marL="1584061" indent="0">
               <a:buNone/>
-              <a:defRPr sz="1680" b="1"/>
+              <a:defRPr sz="1848" b="1"/>
             </a:lvl4pPr>
-            <a:lvl5pPr marL="1919874" indent="0">
+            <a:lvl5pPr marL="2112081" indent="0">
               <a:buNone/>
-              <a:defRPr sz="1680" b="1"/>
+              <a:defRPr sz="1848" b="1"/>
             </a:lvl5pPr>
-            <a:lvl6pPr marL="2399843" indent="0">
+            <a:lvl6pPr marL="2640101" indent="0">
               <a:buNone/>
-              <a:defRPr sz="1680" b="1"/>
+              <a:defRPr sz="1848" b="1"/>
             </a:lvl6pPr>
-            <a:lvl7pPr marL="2879811" indent="0">
+            <a:lvl7pPr marL="3168122" indent="0">
               <a:buNone/>
-              <a:defRPr sz="1680" b="1"/>
+              <a:defRPr sz="1848" b="1"/>
             </a:lvl7pPr>
-            <a:lvl8pPr marL="3359780" indent="0">
+            <a:lvl8pPr marL="3696142" indent="0">
               <a:buNone/>
-              <a:defRPr sz="1680" b="1"/>
+              <a:defRPr sz="1848" b="1"/>
             </a:lvl8pPr>
-            <a:lvl9pPr marL="3839748" indent="0">
+            <a:lvl9pPr marL="4224162" indent="0">
               <a:buNone/>
-              <a:defRPr sz="1680" b="1"/>
+              <a:defRPr sz="1848" b="1"/>
             </a:lvl9pPr>
           </a:lstStyle>
           <a:p>
             <a:pPr lvl="0"/>
             <a:r>
-              <a:rPr lang="en-US" smtClean="0"/>
+              <a:rPr lang="en-US"/>
               <a:t>Edit Master text styles</a:t>
             </a:r>
           </a:p>
@@ -5948,8 +5944,8 @@
         </p:nvSpPr>
         <p:spPr>
           <a:xfrm>
-            <a:off x="1487781" y="2629749"/>
-            <a:ext cx="9137611" cy="3867965"/>
+            <a:off x="1487781" y="2893014"/>
+            <a:ext cx="9137611" cy="4255188"/>
           </a:xfrm>
         </p:spPr>
         <p:txBody>
@@ -5958,35 +5954,35 @@
           <a:p>
             <a:pPr lvl="0"/>
             <a:r>
-              <a:rPr lang="en-US" smtClean="0"/>
+              <a:rPr lang="en-US"/>
               <a:t>Edit Master text styles</a:t>
             </a:r>
           </a:p>
           <a:p>
             <a:pPr lvl="1"/>
             <a:r>
-              <a:rPr lang="en-US" smtClean="0"/>
+              <a:rPr lang="en-US"/>
               <a:t>Second level</a:t>
             </a:r>
           </a:p>
           <a:p>
             <a:pPr lvl="2"/>
             <a:r>
-              <a:rPr lang="en-US" smtClean="0"/>
+              <a:rPr lang="en-US"/>
               <a:t>Third level</a:t>
             </a:r>
           </a:p>
           <a:p>
             <a:pPr lvl="3"/>
             <a:r>
-              <a:rPr lang="en-US" smtClean="0"/>
+              <a:rPr lang="en-US"/>
               <a:t>Fourth level</a:t>
             </a:r>
           </a:p>
           <a:p>
             <a:pPr lvl="4"/>
             <a:r>
-              <a:rPr lang="en-US" smtClean="0"/>
+              <a:rPr lang="en-US"/>
               <a:t>Fifth level</a:t>
             </a:r>
             <a:endParaRPr lang="en-US" dirty="0"/>
@@ -6005,8 +6001,8 @@
         </p:nvSpPr>
         <p:spPr>
           <a:xfrm>
-            <a:off x="10934760" y="1764832"/>
-            <a:ext cx="9182611" cy="864917"/>
+            <a:off x="10934760" y="1941510"/>
+            <a:ext cx="9182611" cy="951504"/>
           </a:xfrm>
         </p:spPr>
         <p:txBody>
@@ -6014,45 +6010,45 @@
           <a:lstStyle>
             <a:lvl1pPr marL="0" indent="0">
               <a:buNone/>
-              <a:defRPr sz="2520" b="1"/>
+              <a:defRPr sz="2772" b="1"/>
             </a:lvl1pPr>
-            <a:lvl2pPr marL="479969" indent="0">
+            <a:lvl2pPr marL="528020" indent="0">
               <a:buNone/>
-              <a:defRPr sz="2100" b="1"/>
+              <a:defRPr sz="2310" b="1"/>
             </a:lvl2pPr>
-            <a:lvl3pPr marL="959937" indent="0">
+            <a:lvl3pPr marL="1056041" indent="0">
               <a:buNone/>
-              <a:defRPr sz="1890" b="1"/>
+              <a:defRPr sz="2079" b="1"/>
             </a:lvl3pPr>
-            <a:lvl4pPr marL="1439906" indent="0">
+            <a:lvl4pPr marL="1584061" indent="0">
               <a:buNone/>
-              <a:defRPr sz="1680" b="1"/>
+              <a:defRPr sz="1848" b="1"/>
             </a:lvl4pPr>
-            <a:lvl5pPr marL="1919874" indent="0">
+            <a:lvl5pPr marL="2112081" indent="0">
               <a:buNone/>
-              <a:defRPr sz="1680" b="1"/>
+              <a:defRPr sz="1848" b="1"/>
             </a:lvl5pPr>
-            <a:lvl6pPr marL="2399843" indent="0">
+            <a:lvl6pPr marL="2640101" indent="0">
               <a:buNone/>
-              <a:defRPr sz="1680" b="1"/>
+              <a:defRPr sz="1848" b="1"/>
             </a:lvl6pPr>
-            <a:lvl7pPr marL="2879811" indent="0">
+            <a:lvl7pPr marL="3168122" indent="0">
               <a:buNone/>
-              <a:defRPr sz="1680" b="1"/>
+              <a:defRPr sz="1848" b="1"/>
             </a:lvl7pPr>
-            <a:lvl8pPr marL="3359780" indent="0">
+            <a:lvl8pPr marL="3696142" indent="0">
               <a:buNone/>
-              <a:defRPr sz="1680" b="1"/>
+              <a:defRPr sz="1848" b="1"/>
             </a:lvl8pPr>
-            <a:lvl9pPr marL="3839748" indent="0">
+            <a:lvl9pPr marL="4224162" indent="0">
               <a:buNone/>
-              <a:defRPr sz="1680" b="1"/>
+              <a:defRPr sz="1848" b="1"/>
             </a:lvl9pPr>
           </a:lstStyle>
           <a:p>
             <a:pPr lvl="0"/>
             <a:r>
-              <a:rPr lang="en-US" smtClean="0"/>
+              <a:rPr lang="en-US"/>
               <a:t>Edit Master text styles</a:t>
             </a:r>
           </a:p>
@@ -6070,8 +6066,8 @@
         </p:nvSpPr>
         <p:spPr>
           <a:xfrm>
-            <a:off x="10934760" y="2629749"/>
-            <a:ext cx="9182611" cy="3867965"/>
+            <a:off x="10934760" y="2893014"/>
+            <a:ext cx="9182611" cy="4255188"/>
           </a:xfrm>
         </p:spPr>
         <p:txBody>
@@ -6080,35 +6076,35 @@
           <a:p>
             <a:pPr lvl="0"/>
             <a:r>
-              <a:rPr lang="en-US" smtClean="0"/>
+              <a:rPr lang="en-US"/>
               <a:t>Edit Master text styles</a:t>
             </a:r>
           </a:p>
           <a:p>
             <a:pPr lvl="1"/>
             <a:r>
-              <a:rPr lang="en-US" smtClean="0"/>
+              <a:rPr lang="en-US"/>
               <a:t>Second level</a:t>
             </a:r>
           </a:p>
           <a:p>
             <a:pPr lvl="2"/>
             <a:r>
-              <a:rPr lang="en-US" smtClean="0"/>
+              <a:rPr lang="en-US"/>
               <a:t>Third level</a:t>
             </a:r>
           </a:p>
           <a:p>
             <a:pPr lvl="3"/>
             <a:r>
-              <a:rPr lang="en-US" smtClean="0"/>
+              <a:rPr lang="en-US"/>
               <a:t>Fourth level</a:t>
             </a:r>
           </a:p>
           <a:p>
             <a:pPr lvl="4"/>
             <a:r>
-              <a:rPr lang="en-US" smtClean="0"/>
+              <a:rPr lang="en-US"/>
               <a:t>Fifth level</a:t>
             </a:r>
             <a:endParaRPr lang="en-US" dirty="0"/>
@@ -6132,7 +6128,7 @@
           <a:p>
             <a:fld id="{A7C64783-50C8-4BC2-AC3B-DB97829B1D6E}" type="datetimeFigureOut">
               <a:rPr lang="en-GB" smtClean="0"/>
-              <a:t>29/08/2018</a:t>
+              <a:t>22/10/2018</a:t>
             </a:fld>
             <a:endParaRPr lang="en-GB"/>
           </a:p>
@@ -6183,7 +6179,7 @@
     </p:spTree>
     <p:extLst>
       <p:ext uri="{BB962C8B-B14F-4D97-AF65-F5344CB8AC3E}">
-        <p14:creationId xmlns:p14="http://schemas.microsoft.com/office/powerpoint/2010/main" val="4074516175"/>
+        <p14:creationId xmlns:p14="http://schemas.microsoft.com/office/powerpoint/2010/main" val="3891844454"/>
       </p:ext>
     </p:extLst>
   </p:cSld>
@@ -6226,7 +6222,7 @@
           <a:lstStyle/>
           <a:p>
             <a:r>
-              <a:rPr lang="en-US" smtClean="0"/>
+              <a:rPr lang="en-US"/>
               <a:t>Click to edit Master title style</a:t>
             </a:r>
             <a:endParaRPr lang="en-US" dirty="0"/>
@@ -6250,7 +6246,7 @@
           <a:p>
             <a:fld id="{A7C64783-50C8-4BC2-AC3B-DB97829B1D6E}" type="datetimeFigureOut">
               <a:rPr lang="en-GB" smtClean="0"/>
-              <a:t>29/08/2018</a:t>
+              <a:t>22/10/2018</a:t>
             </a:fld>
             <a:endParaRPr lang="en-GB"/>
           </a:p>
@@ -6301,7 +6297,7 @@
     </p:spTree>
     <p:extLst>
       <p:ext uri="{BB962C8B-B14F-4D97-AF65-F5344CB8AC3E}">
-        <p14:creationId xmlns:p14="http://schemas.microsoft.com/office/powerpoint/2010/main" val="2616049357"/>
+        <p14:creationId xmlns:p14="http://schemas.microsoft.com/office/powerpoint/2010/main" val="3047605902"/>
       </p:ext>
     </p:extLst>
   </p:cSld>
@@ -6345,7 +6341,7 @@
           <a:p>
             <a:fld id="{A7C64783-50C8-4BC2-AC3B-DB97829B1D6E}" type="datetimeFigureOut">
               <a:rPr lang="en-GB" smtClean="0"/>
-              <a:t>29/08/2018</a:t>
+              <a:t>22/10/2018</a:t>
             </a:fld>
             <a:endParaRPr lang="en-GB"/>
           </a:p>
@@ -6396,7 +6392,7 @@
     </p:spTree>
     <p:extLst>
       <p:ext uri="{BB962C8B-B14F-4D97-AF65-F5344CB8AC3E}">
-        <p14:creationId xmlns:p14="http://schemas.microsoft.com/office/powerpoint/2010/main" val="674806149"/>
+        <p14:creationId xmlns:p14="http://schemas.microsoft.com/office/powerpoint/2010/main" val="1113496630"/>
       </p:ext>
     </p:extLst>
   </p:cSld>
@@ -6435,20 +6431,20 @@
         </p:nvSpPr>
         <p:spPr>
           <a:xfrm>
-            <a:off x="1487782" y="479954"/>
-            <a:ext cx="6966408" cy="1679840"/>
+            <a:off x="1487782" y="528002"/>
+            <a:ext cx="6966408" cy="1848009"/>
           </a:xfrm>
         </p:spPr>
         <p:txBody>
           <a:bodyPr anchor="b"/>
           <a:lstStyle>
             <a:lvl1pPr>
-              <a:defRPr sz="3359"/>
+              <a:defRPr sz="3696"/>
             </a:lvl1pPr>
           </a:lstStyle>
           <a:p>
             <a:r>
-              <a:rPr lang="en-US" smtClean="0"/>
+              <a:rPr lang="en-US"/>
               <a:t>Click to edit Master title style</a:t>
             </a:r>
             <a:endParaRPr lang="en-US" dirty="0"/>
@@ -6467,73 +6463,73 @@
         </p:nvSpPr>
         <p:spPr>
           <a:xfrm>
-            <a:off x="9182611" y="1036569"/>
-            <a:ext cx="10934760" cy="5116178"/>
+            <a:off x="9182611" y="1140340"/>
+            <a:ext cx="10934760" cy="5628360"/>
           </a:xfrm>
         </p:spPr>
         <p:txBody>
           <a:bodyPr/>
           <a:lstStyle>
             <a:lvl1pPr>
-              <a:defRPr sz="3359"/>
+              <a:defRPr sz="3696"/>
             </a:lvl1pPr>
             <a:lvl2pPr>
-              <a:defRPr sz="2939"/>
+              <a:defRPr sz="3234"/>
             </a:lvl2pPr>
             <a:lvl3pPr>
-              <a:defRPr sz="2520"/>
+              <a:defRPr sz="2772"/>
             </a:lvl3pPr>
             <a:lvl4pPr>
-              <a:defRPr sz="2100"/>
+              <a:defRPr sz="2310"/>
             </a:lvl4pPr>
             <a:lvl5pPr>
-              <a:defRPr sz="2100"/>
+              <a:defRPr sz="2310"/>
             </a:lvl5pPr>
             <a:lvl6pPr>
-              <a:defRPr sz="2100"/>
+              <a:defRPr sz="2310"/>
             </a:lvl6pPr>
             <a:lvl7pPr>
-              <a:defRPr sz="2100"/>
+              <a:defRPr sz="2310"/>
             </a:lvl7pPr>
             <a:lvl8pPr>
-              <a:defRPr sz="2100"/>
+              <a:defRPr sz="2310"/>
             </a:lvl8pPr>
             <a:lvl9pPr>
-              <a:defRPr sz="2100"/>
+              <a:defRPr sz="2310"/>
             </a:lvl9pPr>
           </a:lstStyle>
           <a:p>
             <a:pPr lvl="0"/>
             <a:r>
-              <a:rPr lang="en-US" smtClean="0"/>
+              <a:rPr lang="en-US"/>
               <a:t>Edit Master text styles</a:t>
             </a:r>
           </a:p>
           <a:p>
             <a:pPr lvl="1"/>
             <a:r>
-              <a:rPr lang="en-US" smtClean="0"/>
+              <a:rPr lang="en-US"/>
               <a:t>Second level</a:t>
             </a:r>
           </a:p>
           <a:p>
             <a:pPr lvl="2"/>
             <a:r>
-              <a:rPr lang="en-US" smtClean="0"/>
+              <a:rPr lang="en-US"/>
               <a:t>Third level</a:t>
             </a:r>
           </a:p>
           <a:p>
             <a:pPr lvl="3"/>
             <a:r>
-              <a:rPr lang="en-US" smtClean="0"/>
+              <a:rPr lang="en-US"/>
               <a:t>Fourth level</a:t>
             </a:r>
           </a:p>
           <a:p>
             <a:pPr lvl="4"/>
             <a:r>
-              <a:rPr lang="en-US" smtClean="0"/>
+              <a:rPr lang="en-US"/>
               <a:t>Fifth level</a:t>
             </a:r>
             <a:endParaRPr lang="en-US" dirty="0"/>
@@ -6552,8 +6548,8 @@
         </p:nvSpPr>
         <p:spPr>
           <a:xfrm>
-            <a:off x="1487782" y="2159794"/>
-            <a:ext cx="6966408" cy="4001285"/>
+            <a:off x="1487782" y="2376011"/>
+            <a:ext cx="6966408" cy="4401855"/>
           </a:xfrm>
         </p:spPr>
         <p:txBody>
@@ -6561,45 +6557,45 @@
           <a:lstStyle>
             <a:lvl1pPr marL="0" indent="0">
               <a:buNone/>
-              <a:defRPr sz="1680"/>
+              <a:defRPr sz="1848"/>
             </a:lvl1pPr>
-            <a:lvl2pPr marL="479969" indent="0">
+            <a:lvl2pPr marL="528020" indent="0">
               <a:buNone/>
-              <a:defRPr sz="1470"/>
+              <a:defRPr sz="1617"/>
             </a:lvl2pPr>
-            <a:lvl3pPr marL="959937" indent="0">
+            <a:lvl3pPr marL="1056041" indent="0">
               <a:buNone/>
-              <a:defRPr sz="1260"/>
+              <a:defRPr sz="1386"/>
             </a:lvl3pPr>
-            <a:lvl4pPr marL="1439906" indent="0">
+            <a:lvl4pPr marL="1584061" indent="0">
               <a:buNone/>
-              <a:defRPr sz="1050"/>
+              <a:defRPr sz="1155"/>
             </a:lvl4pPr>
-            <a:lvl5pPr marL="1919874" indent="0">
+            <a:lvl5pPr marL="2112081" indent="0">
               <a:buNone/>
-              <a:defRPr sz="1050"/>
+              <a:defRPr sz="1155"/>
             </a:lvl5pPr>
-            <a:lvl6pPr marL="2399843" indent="0">
+            <a:lvl6pPr marL="2640101" indent="0">
               <a:buNone/>
-              <a:defRPr sz="1050"/>
+              <a:defRPr sz="1155"/>
             </a:lvl6pPr>
-            <a:lvl7pPr marL="2879811" indent="0">
+            <a:lvl7pPr marL="3168122" indent="0">
               <a:buNone/>
-              <a:defRPr sz="1050"/>
+              <a:defRPr sz="1155"/>
             </a:lvl7pPr>
-            <a:lvl8pPr marL="3359780" indent="0">
+            <a:lvl8pPr marL="3696142" indent="0">
               <a:buNone/>
-              <a:defRPr sz="1050"/>
+              <a:defRPr sz="1155"/>
             </a:lvl8pPr>
-            <a:lvl9pPr marL="3839748" indent="0">
+            <a:lvl9pPr marL="4224162" indent="0">
               <a:buNone/>
-              <a:defRPr sz="1050"/>
+              <a:defRPr sz="1155"/>
             </a:lvl9pPr>
           </a:lstStyle>
           <a:p>
             <a:pPr lvl="0"/>
             <a:r>
-              <a:rPr lang="en-US" smtClean="0"/>
+              <a:rPr lang="en-US"/>
               <a:t>Edit Master text styles</a:t>
             </a:r>
           </a:p>
@@ -6622,7 +6618,7 @@
           <a:p>
             <a:fld id="{A7C64783-50C8-4BC2-AC3B-DB97829B1D6E}" type="datetimeFigureOut">
               <a:rPr lang="en-GB" smtClean="0"/>
-              <a:t>29/08/2018</a:t>
+              <a:t>22/10/2018</a:t>
             </a:fld>
             <a:endParaRPr lang="en-GB"/>
           </a:p>
@@ -6673,7 +6669,7 @@
     </p:spTree>
     <p:extLst>
       <p:ext uri="{BB962C8B-B14F-4D97-AF65-F5344CB8AC3E}">
-        <p14:creationId xmlns:p14="http://schemas.microsoft.com/office/powerpoint/2010/main" val="3926943196"/>
+        <p14:creationId xmlns:p14="http://schemas.microsoft.com/office/powerpoint/2010/main" val="712295440"/>
       </p:ext>
     </p:extLst>
   </p:cSld>
@@ -6712,20 +6708,20 @@
         </p:nvSpPr>
         <p:spPr>
           <a:xfrm>
-            <a:off x="1487782" y="479954"/>
-            <a:ext cx="6966408" cy="1679840"/>
+            <a:off x="1487782" y="528002"/>
+            <a:ext cx="6966408" cy="1848009"/>
           </a:xfrm>
         </p:spPr>
         <p:txBody>
           <a:bodyPr anchor="b"/>
           <a:lstStyle>
             <a:lvl1pPr>
-              <a:defRPr sz="3359"/>
+              <a:defRPr sz="3696"/>
             </a:lvl1pPr>
           </a:lstStyle>
           <a:p>
             <a:r>
-              <a:rPr lang="en-US" smtClean="0"/>
+              <a:rPr lang="en-US"/>
               <a:t>Click to edit Master title style</a:t>
             </a:r>
             <a:endParaRPr lang="en-US" dirty="0"/>
@@ -6744,8 +6740,8 @@
         </p:nvSpPr>
         <p:spPr>
           <a:xfrm>
-            <a:off x="9182611" y="1036569"/>
-            <a:ext cx="10934760" cy="5116178"/>
+            <a:off x="9182611" y="1140340"/>
+            <a:ext cx="10934760" cy="5628360"/>
           </a:xfrm>
         </p:spPr>
         <p:txBody>
@@ -6753,44 +6749,44 @@
           <a:lstStyle>
             <a:lvl1pPr marL="0" indent="0">
               <a:buNone/>
-              <a:defRPr sz="3359"/>
+              <a:defRPr sz="3696"/>
             </a:lvl1pPr>
-            <a:lvl2pPr marL="479969" indent="0">
+            <a:lvl2pPr marL="528020" indent="0">
               <a:buNone/>
-              <a:defRPr sz="2939"/>
+              <a:defRPr sz="3234"/>
             </a:lvl2pPr>
-            <a:lvl3pPr marL="959937" indent="0">
+            <a:lvl3pPr marL="1056041" indent="0">
               <a:buNone/>
-              <a:defRPr sz="2520"/>
+              <a:defRPr sz="2772"/>
             </a:lvl3pPr>
-            <a:lvl4pPr marL="1439906" indent="0">
+            <a:lvl4pPr marL="1584061" indent="0">
               <a:buNone/>
-              <a:defRPr sz="2100"/>
+              <a:defRPr sz="2310"/>
             </a:lvl4pPr>
-            <a:lvl5pPr marL="1919874" indent="0">
+            <a:lvl5pPr marL="2112081" indent="0">
               <a:buNone/>
-              <a:defRPr sz="2100"/>
+              <a:defRPr sz="2310"/>
             </a:lvl5pPr>
-            <a:lvl6pPr marL="2399843" indent="0">
+            <a:lvl6pPr marL="2640101" indent="0">
               <a:buNone/>
-              <a:defRPr sz="2100"/>
+              <a:defRPr sz="2310"/>
             </a:lvl6pPr>
-            <a:lvl7pPr marL="2879811" indent="0">
+            <a:lvl7pPr marL="3168122" indent="0">
               <a:buNone/>
-              <a:defRPr sz="2100"/>
+              <a:defRPr sz="2310"/>
             </a:lvl7pPr>
-            <a:lvl8pPr marL="3359780" indent="0">
+            <a:lvl8pPr marL="3696142" indent="0">
               <a:buNone/>
-              <a:defRPr sz="2100"/>
+              <a:defRPr sz="2310"/>
             </a:lvl8pPr>
-            <a:lvl9pPr marL="3839748" indent="0">
+            <a:lvl9pPr marL="4224162" indent="0">
               <a:buNone/>
-              <a:defRPr sz="2100"/>
+              <a:defRPr sz="2310"/>
             </a:lvl9pPr>
           </a:lstStyle>
           <a:p>
             <a:r>
-              <a:rPr lang="en-US" smtClean="0"/>
+              <a:rPr lang="en-US"/>
               <a:t>Click icon to add picture</a:t>
             </a:r>
             <a:endParaRPr lang="en-US" dirty="0"/>
@@ -6809,8 +6805,8 @@
         </p:nvSpPr>
         <p:spPr>
           <a:xfrm>
-            <a:off x="1487782" y="2159794"/>
-            <a:ext cx="6966408" cy="4001285"/>
+            <a:off x="1487782" y="2376011"/>
+            <a:ext cx="6966408" cy="4401855"/>
           </a:xfrm>
         </p:spPr>
         <p:txBody>
@@ -6818,45 +6814,45 @@
           <a:lstStyle>
             <a:lvl1pPr marL="0" indent="0">
               <a:buNone/>
-              <a:defRPr sz="1680"/>
+              <a:defRPr sz="1848"/>
             </a:lvl1pPr>
-            <a:lvl2pPr marL="479969" indent="0">
+            <a:lvl2pPr marL="528020" indent="0">
               <a:buNone/>
-              <a:defRPr sz="1470"/>
+              <a:defRPr sz="1617"/>
             </a:lvl2pPr>
-            <a:lvl3pPr marL="959937" indent="0">
+            <a:lvl3pPr marL="1056041" indent="0">
               <a:buNone/>
-              <a:defRPr sz="1260"/>
+              <a:defRPr sz="1386"/>
             </a:lvl3pPr>
-            <a:lvl4pPr marL="1439906" indent="0">
+            <a:lvl4pPr marL="1584061" indent="0">
               <a:buNone/>
-              <a:defRPr sz="1050"/>
+              <a:defRPr sz="1155"/>
             </a:lvl4pPr>
-            <a:lvl5pPr marL="1919874" indent="0">
+            <a:lvl5pPr marL="2112081" indent="0">
               <a:buNone/>
-              <a:defRPr sz="1050"/>
+              <a:defRPr sz="1155"/>
             </a:lvl5pPr>
-            <a:lvl6pPr marL="2399843" indent="0">
+            <a:lvl6pPr marL="2640101" indent="0">
               <a:buNone/>
-              <a:defRPr sz="1050"/>
+              <a:defRPr sz="1155"/>
             </a:lvl6pPr>
-            <a:lvl7pPr marL="2879811" indent="0">
+            <a:lvl7pPr marL="3168122" indent="0">
               <a:buNone/>
-              <a:defRPr sz="1050"/>
+              <a:defRPr sz="1155"/>
             </a:lvl7pPr>
-            <a:lvl8pPr marL="3359780" indent="0">
+            <a:lvl8pPr marL="3696142" indent="0">
               <a:buNone/>
-              <a:defRPr sz="1050"/>
+              <a:defRPr sz="1155"/>
             </a:lvl8pPr>
-            <a:lvl9pPr marL="3839748" indent="0">
+            <a:lvl9pPr marL="4224162" indent="0">
               <a:buNone/>
-              <a:defRPr sz="1050"/>
+              <a:defRPr sz="1155"/>
             </a:lvl9pPr>
           </a:lstStyle>
           <a:p>
             <a:pPr lvl="0"/>
             <a:r>
-              <a:rPr lang="en-US" smtClean="0"/>
+              <a:rPr lang="en-US"/>
               <a:t>Edit Master text styles</a:t>
             </a:r>
           </a:p>
@@ -6879,7 +6875,7 @@
           <a:p>
             <a:fld id="{A7C64783-50C8-4BC2-AC3B-DB97829B1D6E}" type="datetimeFigureOut">
               <a:rPr lang="en-GB" smtClean="0"/>
-              <a:t>29/08/2018</a:t>
+              <a:t>22/10/2018</a:t>
             </a:fld>
             <a:endParaRPr lang="en-GB"/>
           </a:p>
@@ -6930,7 +6926,7 @@
     </p:spTree>
     <p:extLst>
       <p:ext uri="{BB962C8B-B14F-4D97-AF65-F5344CB8AC3E}">
-        <p14:creationId xmlns:p14="http://schemas.microsoft.com/office/powerpoint/2010/main" val="1809253039"/>
+        <p14:creationId xmlns:p14="http://schemas.microsoft.com/office/powerpoint/2010/main" val="440363196"/>
       </p:ext>
     </p:extLst>
   </p:cSld>
@@ -6974,8 +6970,8 @@
         </p:nvSpPr>
         <p:spPr>
           <a:xfrm>
-            <a:off x="1484968" y="383297"/>
-            <a:ext cx="18629590" cy="1391534"/>
+            <a:off x="1484968" y="421669"/>
+            <a:ext cx="18629590" cy="1530841"/>
           </a:xfrm>
           <a:prstGeom prst="rect">
             <a:avLst/>
@@ -6988,7 +6984,7 @@
           <a:lstStyle/>
           <a:p>
             <a:r>
-              <a:rPr lang="en-US" smtClean="0"/>
+              <a:rPr lang="en-US"/>
               <a:t>Click to edit Master title style</a:t>
             </a:r>
             <a:endParaRPr lang="en-US" dirty="0"/>
@@ -7007,8 +7003,8 @@
         </p:nvSpPr>
         <p:spPr>
           <a:xfrm>
-            <a:off x="1484968" y="1916484"/>
-            <a:ext cx="18629590" cy="4567898"/>
+            <a:off x="1484968" y="2108344"/>
+            <a:ext cx="18629590" cy="5025191"/>
           </a:xfrm>
           <a:prstGeom prst="rect">
             <a:avLst/>
@@ -7022,35 +7018,35 @@
           <a:p>
             <a:pPr lvl="0"/>
             <a:r>
-              <a:rPr lang="en-US" smtClean="0"/>
+              <a:rPr lang="en-US"/>
               <a:t>Edit Master text styles</a:t>
             </a:r>
           </a:p>
           <a:p>
             <a:pPr lvl="1"/>
             <a:r>
-              <a:rPr lang="en-US" smtClean="0"/>
+              <a:rPr lang="en-US"/>
               <a:t>Second level</a:t>
             </a:r>
           </a:p>
           <a:p>
             <a:pPr lvl="2"/>
             <a:r>
-              <a:rPr lang="en-US" smtClean="0"/>
+              <a:rPr lang="en-US"/>
               <a:t>Third level</a:t>
             </a:r>
           </a:p>
           <a:p>
             <a:pPr lvl="3"/>
             <a:r>
-              <a:rPr lang="en-US" smtClean="0"/>
+              <a:rPr lang="en-US"/>
               <a:t>Fourth level</a:t>
             </a:r>
           </a:p>
           <a:p>
             <a:pPr lvl="4"/>
             <a:r>
-              <a:rPr lang="en-US" smtClean="0"/>
+              <a:rPr lang="en-US"/>
               <a:t>Fifth level</a:t>
             </a:r>
             <a:endParaRPr lang="en-US" dirty="0"/>
@@ -7069,8 +7065,8 @@
         </p:nvSpPr>
         <p:spPr>
           <a:xfrm>
-            <a:off x="1484967" y="6672697"/>
-            <a:ext cx="4859893" cy="383297"/>
+            <a:off x="1484967" y="7340702"/>
+            <a:ext cx="4859893" cy="421669"/>
           </a:xfrm>
           <a:prstGeom prst="rect">
             <a:avLst/>
@@ -7080,7 +7076,7 @@
           <a:bodyPr vert="horz" lIns="91440" tIns="45720" rIns="91440" bIns="45720" rtlCol="0" anchor="ctr"/>
           <a:lstStyle>
             <a:lvl1pPr algn="l">
-              <a:defRPr sz="1260">
+              <a:defRPr sz="1386">
                 <a:solidFill>
                   <a:schemeClr val="tx1">
                     <a:tint val="75000"/>
@@ -7092,7 +7088,7 @@
           <a:p>
             <a:fld id="{A7C64783-50C8-4BC2-AC3B-DB97829B1D6E}" type="datetimeFigureOut">
               <a:rPr lang="en-GB" smtClean="0"/>
-              <a:t>29/08/2018</a:t>
+              <a:t>22/10/2018</a:t>
             </a:fld>
             <a:endParaRPr lang="en-GB"/>
           </a:p>
@@ -7110,8 +7106,8 @@
         </p:nvSpPr>
         <p:spPr>
           <a:xfrm>
-            <a:off x="7154843" y="6672697"/>
-            <a:ext cx="7289840" cy="383297"/>
+            <a:off x="7154843" y="7340702"/>
+            <a:ext cx="7289840" cy="421669"/>
           </a:xfrm>
           <a:prstGeom prst="rect">
             <a:avLst/>
@@ -7121,7 +7117,7 @@
           <a:bodyPr vert="horz" lIns="91440" tIns="45720" rIns="91440" bIns="45720" rtlCol="0" anchor="ctr"/>
           <a:lstStyle>
             <a:lvl1pPr algn="ctr">
-              <a:defRPr sz="1260">
+              <a:defRPr sz="1386">
                 <a:solidFill>
                   <a:schemeClr val="tx1">
                     <a:tint val="75000"/>
@@ -7147,8 +7143,8 @@
         </p:nvSpPr>
         <p:spPr>
           <a:xfrm>
-            <a:off x="15254665" y="6672697"/>
-            <a:ext cx="4859893" cy="383297"/>
+            <a:off x="15254665" y="7340702"/>
+            <a:ext cx="4859893" cy="421669"/>
           </a:xfrm>
           <a:prstGeom prst="rect">
             <a:avLst/>
@@ -7158,7 +7154,7 @@
           <a:bodyPr vert="horz" lIns="91440" tIns="45720" rIns="91440" bIns="45720" rtlCol="0" anchor="ctr"/>
           <a:lstStyle>
             <a:lvl1pPr algn="r">
-              <a:defRPr sz="1260">
+              <a:defRPr sz="1386">
                 <a:solidFill>
                   <a:schemeClr val="tx1">
                     <a:tint val="75000"/>
@@ -7179,27 +7175,27 @@
     </p:spTree>
     <p:extLst>
       <p:ext uri="{BB962C8B-B14F-4D97-AF65-F5344CB8AC3E}">
-        <p14:creationId xmlns:p14="http://schemas.microsoft.com/office/powerpoint/2010/main" val="1947514533"/>
+        <p14:creationId xmlns:p14="http://schemas.microsoft.com/office/powerpoint/2010/main" val="261161274"/>
       </p:ext>
     </p:extLst>
   </p:cSld>
   <p:clrMap bg1="lt1" tx1="dk1" bg2="lt2" tx2="dk2" accent1="accent1" accent2="accent2" accent3="accent3" accent4="accent4" accent5="accent5" accent6="accent6" hlink="hlink" folHlink="folHlink"/>
   <p:sldLayoutIdLst>
-    <p:sldLayoutId id="2147483661" r:id="rId1"/>
-    <p:sldLayoutId id="2147483662" r:id="rId2"/>
-    <p:sldLayoutId id="2147483663" r:id="rId3"/>
-    <p:sldLayoutId id="2147483664" r:id="rId4"/>
-    <p:sldLayoutId id="2147483665" r:id="rId5"/>
-    <p:sldLayoutId id="2147483666" r:id="rId6"/>
-    <p:sldLayoutId id="2147483667" r:id="rId7"/>
-    <p:sldLayoutId id="2147483668" r:id="rId8"/>
-    <p:sldLayoutId id="2147483669" r:id="rId9"/>
-    <p:sldLayoutId id="2147483670" r:id="rId10"/>
-    <p:sldLayoutId id="2147483671" r:id="rId11"/>
+    <p:sldLayoutId id="2147483673" r:id="rId1"/>
+    <p:sldLayoutId id="2147483674" r:id="rId2"/>
+    <p:sldLayoutId id="2147483675" r:id="rId3"/>
+    <p:sldLayoutId id="2147483676" r:id="rId4"/>
+    <p:sldLayoutId id="2147483677" r:id="rId5"/>
+    <p:sldLayoutId id="2147483678" r:id="rId6"/>
+    <p:sldLayoutId id="2147483679" r:id="rId7"/>
+    <p:sldLayoutId id="2147483680" r:id="rId8"/>
+    <p:sldLayoutId id="2147483681" r:id="rId9"/>
+    <p:sldLayoutId id="2147483682" r:id="rId10"/>
+    <p:sldLayoutId id="2147483683" r:id="rId11"/>
   </p:sldLayoutIdLst>
   <p:txStyles>
     <p:titleStyle>
-      <a:lvl1pPr algn="l" defTabSz="959937" rtl="0" eaLnBrk="1" latinLnBrk="0" hangingPunct="1">
+      <a:lvl1pPr algn="l" defTabSz="1056041" rtl="0" eaLnBrk="1" latinLnBrk="0" hangingPunct="1">
         <a:lnSpc>
           <a:spcPct val="90000"/>
         </a:lnSpc>
@@ -7207,7 +7203,7 @@
           <a:spcPct val="0"/>
         </a:spcBef>
         <a:buNone/>
-        <a:defRPr sz="4619" kern="1200">
+        <a:defRPr sz="5082" kern="1200">
           <a:solidFill>
             <a:schemeClr val="tx1"/>
           </a:solidFill>
@@ -7218,16 +7214,16 @@
       </a:lvl1pPr>
     </p:titleStyle>
     <p:bodyStyle>
-      <a:lvl1pPr marL="239984" indent="-239984" algn="l" defTabSz="959937" rtl="0" eaLnBrk="1" latinLnBrk="0" hangingPunct="1">
+      <a:lvl1pPr marL="264010" indent="-264010" algn="l" defTabSz="1056041" rtl="0" eaLnBrk="1" latinLnBrk="0" hangingPunct="1">
         <a:lnSpc>
           <a:spcPct val="90000"/>
         </a:lnSpc>
         <a:spcBef>
-          <a:spcPts val="1050"/>
+          <a:spcPts val="1155"/>
         </a:spcBef>
         <a:buFont typeface="Arial" panose="020B0604020202020204" pitchFamily="34" charset="0"/>
         <a:buChar char="•"/>
-        <a:defRPr sz="2939" kern="1200">
+        <a:defRPr sz="3234" kern="1200">
           <a:solidFill>
             <a:schemeClr val="tx1"/>
           </a:solidFill>
@@ -7236,16 +7232,16 @@
           <a:cs typeface="+mn-cs"/>
         </a:defRPr>
       </a:lvl1pPr>
-      <a:lvl2pPr marL="719953" indent="-239984" algn="l" defTabSz="959937" rtl="0" eaLnBrk="1" latinLnBrk="0" hangingPunct="1">
+      <a:lvl2pPr marL="792030" indent="-264010" algn="l" defTabSz="1056041" rtl="0" eaLnBrk="1" latinLnBrk="0" hangingPunct="1">
         <a:lnSpc>
           <a:spcPct val="90000"/>
         </a:lnSpc>
         <a:spcBef>
-          <a:spcPts val="525"/>
+          <a:spcPts val="577"/>
         </a:spcBef>
         <a:buFont typeface="Arial" panose="020B0604020202020204" pitchFamily="34" charset="0"/>
         <a:buChar char="•"/>
-        <a:defRPr sz="2520" kern="1200">
+        <a:defRPr sz="2772" kern="1200">
           <a:solidFill>
             <a:schemeClr val="tx1"/>
           </a:solidFill>
@@ -7254,16 +7250,16 @@
           <a:cs typeface="+mn-cs"/>
         </a:defRPr>
       </a:lvl2pPr>
-      <a:lvl3pPr marL="1199921" indent="-239984" algn="l" defTabSz="959937" rtl="0" eaLnBrk="1" latinLnBrk="0" hangingPunct="1">
+      <a:lvl3pPr marL="1320051" indent="-264010" algn="l" defTabSz="1056041" rtl="0" eaLnBrk="1" latinLnBrk="0" hangingPunct="1">
         <a:lnSpc>
           <a:spcPct val="90000"/>
         </a:lnSpc>
         <a:spcBef>
-          <a:spcPts val="525"/>
+          <a:spcPts val="577"/>
         </a:spcBef>
         <a:buFont typeface="Arial" panose="020B0604020202020204" pitchFamily="34" charset="0"/>
         <a:buChar char="•"/>
-        <a:defRPr sz="2100" kern="1200">
+        <a:defRPr sz="2310" kern="1200">
           <a:solidFill>
             <a:schemeClr val="tx1"/>
           </a:solidFill>
@@ -7272,16 +7268,16 @@
           <a:cs typeface="+mn-cs"/>
         </a:defRPr>
       </a:lvl3pPr>
-      <a:lvl4pPr marL="1679890" indent="-239984" algn="l" defTabSz="959937" rtl="0" eaLnBrk="1" latinLnBrk="0" hangingPunct="1">
+      <a:lvl4pPr marL="1848071" indent="-264010" algn="l" defTabSz="1056041" rtl="0" eaLnBrk="1" latinLnBrk="0" hangingPunct="1">
         <a:lnSpc>
           <a:spcPct val="90000"/>
         </a:lnSpc>
         <a:spcBef>
-          <a:spcPts val="525"/>
+          <a:spcPts val="577"/>
         </a:spcBef>
         <a:buFont typeface="Arial" panose="020B0604020202020204" pitchFamily="34" charset="0"/>
         <a:buChar char="•"/>
-        <a:defRPr sz="1890" kern="1200">
+        <a:defRPr sz="2079" kern="1200">
           <a:solidFill>
             <a:schemeClr val="tx1"/>
           </a:solidFill>
@@ -7290,16 +7286,16 @@
           <a:cs typeface="+mn-cs"/>
         </a:defRPr>
       </a:lvl4pPr>
-      <a:lvl5pPr marL="2159859" indent="-239984" algn="l" defTabSz="959937" rtl="0" eaLnBrk="1" latinLnBrk="0" hangingPunct="1">
+      <a:lvl5pPr marL="2376091" indent="-264010" algn="l" defTabSz="1056041" rtl="0" eaLnBrk="1" latinLnBrk="0" hangingPunct="1">
         <a:lnSpc>
           <a:spcPct val="90000"/>
         </a:lnSpc>
         <a:spcBef>
-          <a:spcPts val="525"/>
+          <a:spcPts val="577"/>
         </a:spcBef>
         <a:buFont typeface="Arial" panose="020B0604020202020204" pitchFamily="34" charset="0"/>
         <a:buChar char="•"/>
-        <a:defRPr sz="1890" kern="1200">
+        <a:defRPr sz="2079" kern="1200">
           <a:solidFill>
             <a:schemeClr val="tx1"/>
           </a:solidFill>
@@ -7308,16 +7304,16 @@
           <a:cs typeface="+mn-cs"/>
         </a:defRPr>
       </a:lvl5pPr>
-      <a:lvl6pPr marL="2639827" indent="-239984" algn="l" defTabSz="959937" rtl="0" eaLnBrk="1" latinLnBrk="0" hangingPunct="1">
+      <a:lvl6pPr marL="2904112" indent="-264010" algn="l" defTabSz="1056041" rtl="0" eaLnBrk="1" latinLnBrk="0" hangingPunct="1">
         <a:lnSpc>
           <a:spcPct val="90000"/>
         </a:lnSpc>
         <a:spcBef>
-          <a:spcPts val="525"/>
+          <a:spcPts val="577"/>
         </a:spcBef>
         <a:buFont typeface="Arial" panose="020B0604020202020204" pitchFamily="34" charset="0"/>
         <a:buChar char="•"/>
-        <a:defRPr sz="1890" kern="1200">
+        <a:defRPr sz="2079" kern="1200">
           <a:solidFill>
             <a:schemeClr val="tx1"/>
           </a:solidFill>
@@ -7326,16 +7322,16 @@
           <a:cs typeface="+mn-cs"/>
         </a:defRPr>
       </a:lvl6pPr>
-      <a:lvl7pPr marL="3119796" indent="-239984" algn="l" defTabSz="959937" rtl="0" eaLnBrk="1" latinLnBrk="0" hangingPunct="1">
+      <a:lvl7pPr marL="3432132" indent="-264010" algn="l" defTabSz="1056041" rtl="0" eaLnBrk="1" latinLnBrk="0" hangingPunct="1">
         <a:lnSpc>
           <a:spcPct val="90000"/>
         </a:lnSpc>
         <a:spcBef>
-          <a:spcPts val="525"/>
+          <a:spcPts val="577"/>
         </a:spcBef>
         <a:buFont typeface="Arial" panose="020B0604020202020204" pitchFamily="34" charset="0"/>
         <a:buChar char="•"/>
-        <a:defRPr sz="1890" kern="1200">
+        <a:defRPr sz="2079" kern="1200">
           <a:solidFill>
             <a:schemeClr val="tx1"/>
           </a:solidFill>
@@ -7344,16 +7340,16 @@
           <a:cs typeface="+mn-cs"/>
         </a:defRPr>
       </a:lvl7pPr>
-      <a:lvl8pPr marL="3599764" indent="-239984" algn="l" defTabSz="959937" rtl="0" eaLnBrk="1" latinLnBrk="0" hangingPunct="1">
+      <a:lvl8pPr marL="3960152" indent="-264010" algn="l" defTabSz="1056041" rtl="0" eaLnBrk="1" latinLnBrk="0" hangingPunct="1">
         <a:lnSpc>
           <a:spcPct val="90000"/>
         </a:lnSpc>
         <a:spcBef>
-          <a:spcPts val="525"/>
+          <a:spcPts val="577"/>
         </a:spcBef>
         <a:buFont typeface="Arial" panose="020B0604020202020204" pitchFamily="34" charset="0"/>
         <a:buChar char="•"/>
-        <a:defRPr sz="1890" kern="1200">
+        <a:defRPr sz="2079" kern="1200">
           <a:solidFill>
             <a:schemeClr val="tx1"/>
           </a:solidFill>
@@ -7362,16 +7358,16 @@
           <a:cs typeface="+mn-cs"/>
         </a:defRPr>
       </a:lvl8pPr>
-      <a:lvl9pPr marL="4079733" indent="-239984" algn="l" defTabSz="959937" rtl="0" eaLnBrk="1" latinLnBrk="0" hangingPunct="1">
+      <a:lvl9pPr marL="4488172" indent="-264010" algn="l" defTabSz="1056041" rtl="0" eaLnBrk="1" latinLnBrk="0" hangingPunct="1">
         <a:lnSpc>
           <a:spcPct val="90000"/>
         </a:lnSpc>
         <a:spcBef>
-          <a:spcPts val="525"/>
+          <a:spcPts val="577"/>
         </a:spcBef>
         <a:buFont typeface="Arial" panose="020B0604020202020204" pitchFamily="34" charset="0"/>
         <a:buChar char="•"/>
-        <a:defRPr sz="1890" kern="1200">
+        <a:defRPr sz="2079" kern="1200">
           <a:solidFill>
             <a:schemeClr val="tx1"/>
           </a:solidFill>
@@ -7385,8 +7381,8 @@
       <a:defPPr>
         <a:defRPr lang="en-US"/>
       </a:defPPr>
-      <a:lvl1pPr marL="0" algn="l" defTabSz="959937" rtl="0" eaLnBrk="1" latinLnBrk="0" hangingPunct="1">
-        <a:defRPr sz="1890" kern="1200">
+      <a:lvl1pPr marL="0" algn="l" defTabSz="1056041" rtl="0" eaLnBrk="1" latinLnBrk="0" hangingPunct="1">
+        <a:defRPr sz="2079" kern="1200">
           <a:solidFill>
             <a:schemeClr val="tx1"/>
           </a:solidFill>
@@ -7395,8 +7391,8 @@
           <a:cs typeface="+mn-cs"/>
         </a:defRPr>
       </a:lvl1pPr>
-      <a:lvl2pPr marL="479969" algn="l" defTabSz="959937" rtl="0" eaLnBrk="1" latinLnBrk="0" hangingPunct="1">
-        <a:defRPr sz="1890" kern="1200">
+      <a:lvl2pPr marL="528020" algn="l" defTabSz="1056041" rtl="0" eaLnBrk="1" latinLnBrk="0" hangingPunct="1">
+        <a:defRPr sz="2079" kern="1200">
           <a:solidFill>
             <a:schemeClr val="tx1"/>
           </a:solidFill>
@@ -7405,8 +7401,8 @@
           <a:cs typeface="+mn-cs"/>
         </a:defRPr>
       </a:lvl2pPr>
-      <a:lvl3pPr marL="959937" algn="l" defTabSz="959937" rtl="0" eaLnBrk="1" latinLnBrk="0" hangingPunct="1">
-        <a:defRPr sz="1890" kern="1200">
+      <a:lvl3pPr marL="1056041" algn="l" defTabSz="1056041" rtl="0" eaLnBrk="1" latinLnBrk="0" hangingPunct="1">
+        <a:defRPr sz="2079" kern="1200">
           <a:solidFill>
             <a:schemeClr val="tx1"/>
           </a:solidFill>
@@ -7415,8 +7411,8 @@
           <a:cs typeface="+mn-cs"/>
         </a:defRPr>
       </a:lvl3pPr>
-      <a:lvl4pPr marL="1439906" algn="l" defTabSz="959937" rtl="0" eaLnBrk="1" latinLnBrk="0" hangingPunct="1">
-        <a:defRPr sz="1890" kern="1200">
+      <a:lvl4pPr marL="1584061" algn="l" defTabSz="1056041" rtl="0" eaLnBrk="1" latinLnBrk="0" hangingPunct="1">
+        <a:defRPr sz="2079" kern="1200">
           <a:solidFill>
             <a:schemeClr val="tx1"/>
           </a:solidFill>
@@ -7425,8 +7421,8 @@
           <a:cs typeface="+mn-cs"/>
         </a:defRPr>
       </a:lvl4pPr>
-      <a:lvl5pPr marL="1919874" algn="l" defTabSz="959937" rtl="0" eaLnBrk="1" latinLnBrk="0" hangingPunct="1">
-        <a:defRPr sz="1890" kern="1200">
+      <a:lvl5pPr marL="2112081" algn="l" defTabSz="1056041" rtl="0" eaLnBrk="1" latinLnBrk="0" hangingPunct="1">
+        <a:defRPr sz="2079" kern="1200">
           <a:solidFill>
             <a:schemeClr val="tx1"/>
           </a:solidFill>
@@ -7435,8 +7431,8 @@
           <a:cs typeface="+mn-cs"/>
         </a:defRPr>
       </a:lvl5pPr>
-      <a:lvl6pPr marL="2399843" algn="l" defTabSz="959937" rtl="0" eaLnBrk="1" latinLnBrk="0" hangingPunct="1">
-        <a:defRPr sz="1890" kern="1200">
+      <a:lvl6pPr marL="2640101" algn="l" defTabSz="1056041" rtl="0" eaLnBrk="1" latinLnBrk="0" hangingPunct="1">
+        <a:defRPr sz="2079" kern="1200">
           <a:solidFill>
             <a:schemeClr val="tx1"/>
           </a:solidFill>
@@ -7445,8 +7441,8 @@
           <a:cs typeface="+mn-cs"/>
         </a:defRPr>
       </a:lvl6pPr>
-      <a:lvl7pPr marL="2879811" algn="l" defTabSz="959937" rtl="0" eaLnBrk="1" latinLnBrk="0" hangingPunct="1">
-        <a:defRPr sz="1890" kern="1200">
+      <a:lvl7pPr marL="3168122" algn="l" defTabSz="1056041" rtl="0" eaLnBrk="1" latinLnBrk="0" hangingPunct="1">
+        <a:defRPr sz="2079" kern="1200">
           <a:solidFill>
             <a:schemeClr val="tx1"/>
           </a:solidFill>
@@ -7455,8 +7451,8 @@
           <a:cs typeface="+mn-cs"/>
         </a:defRPr>
       </a:lvl7pPr>
-      <a:lvl8pPr marL="3359780" algn="l" defTabSz="959937" rtl="0" eaLnBrk="1" latinLnBrk="0" hangingPunct="1">
-        <a:defRPr sz="1890" kern="1200">
+      <a:lvl8pPr marL="3696142" algn="l" defTabSz="1056041" rtl="0" eaLnBrk="1" latinLnBrk="0" hangingPunct="1">
+        <a:defRPr sz="2079" kern="1200">
           <a:solidFill>
             <a:schemeClr val="tx1"/>
           </a:solidFill>
@@ -7465,8 +7461,8 @@
           <a:cs typeface="+mn-cs"/>
         </a:defRPr>
       </a:lvl8pPr>
-      <a:lvl9pPr marL="3839748" algn="l" defTabSz="959937" rtl="0" eaLnBrk="1" latinLnBrk="0" hangingPunct="1">
-        <a:defRPr sz="1890" kern="1200">
+      <a:lvl9pPr marL="4224162" algn="l" defTabSz="1056041" rtl="0" eaLnBrk="1" latinLnBrk="0" hangingPunct="1">
+        <a:defRPr sz="2079" kern="1200">
           <a:solidFill>
             <a:schemeClr val="tx1"/>
           </a:solidFill>
@@ -7506,13 +7502,13 @@
           <p:nvPr>
             <p:extLst>
               <p:ext uri="{D42A27DB-BD31-4B8C-83A1-F6EECF244321}">
-                <p14:modId xmlns:p14="http://schemas.microsoft.com/office/powerpoint/2010/main" val="1288456296"/>
+                <p14:modId xmlns:p14="http://schemas.microsoft.com/office/powerpoint/2010/main" val="2508598160"/>
               </p:ext>
             </p:extLst>
           </p:nvPr>
         </p:nvGraphicFramePr>
         <p:xfrm>
-          <a:off x="0" y="0"/>
+          <a:off x="0" y="-11119"/>
           <a:ext cx="7200000" cy="7200000"/>
         </p:xfrm>
         <a:graphic>
@@ -7530,13 +7526,13 @@
           <p:nvPr>
             <p:extLst>
               <p:ext uri="{D42A27DB-BD31-4B8C-83A1-F6EECF244321}">
-                <p14:modId xmlns:p14="http://schemas.microsoft.com/office/powerpoint/2010/main" val="3767194126"/>
+                <p14:modId xmlns:p14="http://schemas.microsoft.com/office/powerpoint/2010/main" val="1245327787"/>
               </p:ext>
             </p:extLst>
           </p:nvPr>
         </p:nvGraphicFramePr>
         <p:xfrm>
-          <a:off x="7199762" y="-343"/>
+          <a:off x="7199762" y="-11462"/>
           <a:ext cx="7200000" cy="7200000"/>
         </p:xfrm>
         <a:graphic>
@@ -7554,13 +7550,13 @@
           <p:nvPr>
             <p:extLst>
               <p:ext uri="{D42A27DB-BD31-4B8C-83A1-F6EECF244321}">
-                <p14:modId xmlns:p14="http://schemas.microsoft.com/office/powerpoint/2010/main" val="1683385093"/>
+                <p14:modId xmlns:p14="http://schemas.microsoft.com/office/powerpoint/2010/main" val="198435401"/>
               </p:ext>
             </p:extLst>
           </p:nvPr>
         </p:nvGraphicFramePr>
         <p:xfrm>
-          <a:off x="14399524" y="0"/>
+          <a:off x="14399524" y="-11119"/>
           <a:ext cx="7200000" cy="7200000"/>
         </p:xfrm>
         <a:graphic>
@@ -7577,7 +7573,7 @@
         </p:nvSpPr>
         <p:spPr>
           <a:xfrm>
-            <a:off x="10799762" y="0"/>
+            <a:off x="10799762" y="-11118"/>
             <a:ext cx="1620828" cy="511037"/>
           </a:xfrm>
           <a:prstGeom prst="rect">
@@ -7592,10 +7588,9 @@
           <a:lstStyle/>
           <a:p>
             <a:r>
-              <a:rPr lang="en-GB" i="1" dirty="0" smtClean="0"/>
+              <a:rPr lang="en-GB" i="1" dirty="0"/>
               <a:t>First week</a:t>
             </a:r>
-            <a:endParaRPr lang="en-GB" i="1" dirty="0"/>
           </a:p>
         </p:txBody>
       </p:sp>
@@ -7607,7 +7602,7 @@
         </p:nvSpPr>
         <p:spPr>
           <a:xfrm>
-            <a:off x="17657762" y="0"/>
+            <a:off x="17657762" y="-11118"/>
             <a:ext cx="1387816" cy="511037"/>
           </a:xfrm>
           <a:prstGeom prst="rect">
@@ -7622,10 +7617,123 @@
           <a:lstStyle/>
           <a:p>
             <a:r>
-              <a:rPr lang="en-GB" i="1" dirty="0" smtClean="0"/>
+              <a:rPr lang="en-GB" i="1" dirty="0"/>
               <a:t>First day</a:t>
             </a:r>
-            <a:endParaRPr lang="en-GB" i="1" dirty="0"/>
+          </a:p>
+        </p:txBody>
+      </p:sp>
+      <p:sp>
+        <p:nvSpPr>
+          <p:cNvPr id="2" name="TextBox 1">
+            <a:extLst>
+              <a:ext uri="{FF2B5EF4-FFF2-40B4-BE49-F238E27FC236}">
+                <a16:creationId xmlns:a16="http://schemas.microsoft.com/office/drawing/2014/main" id="{BB567524-A1EE-466F-B299-7D337CD8AC27}"/>
+              </a:ext>
+            </a:extLst>
+          </p:cNvPr>
+          <p:cNvSpPr txBox="1"/>
+          <p:nvPr/>
+        </p:nvSpPr>
+        <p:spPr>
+          <a:xfrm>
+            <a:off x="3536843" y="7188538"/>
+            <a:ext cx="809837" cy="769441"/>
+          </a:xfrm>
+          <a:prstGeom prst="rect">
+            <a:avLst/>
+          </a:prstGeom>
+          <a:noFill/>
+        </p:spPr>
+        <p:txBody>
+          <a:bodyPr wrap="none" rtlCol="0">
+            <a:spAutoFit/>
+          </a:bodyPr>
+          <a:lstStyle/>
+          <a:p>
+            <a:r>
+              <a:rPr lang="en-GB" sz="4400" dirty="0">
+                <a:latin typeface="Times New Roman" panose="02020603050405020304" pitchFamily="18" charset="0"/>
+                <a:cs typeface="Times New Roman" panose="02020603050405020304" pitchFamily="18" charset="0"/>
+              </a:rPr>
+              <a:t>(a)</a:t>
+            </a:r>
+          </a:p>
+        </p:txBody>
+      </p:sp>
+      <p:sp>
+        <p:nvSpPr>
+          <p:cNvPr id="10" name="TextBox 9">
+            <a:extLst>
+              <a:ext uri="{FF2B5EF4-FFF2-40B4-BE49-F238E27FC236}">
+                <a16:creationId xmlns:a16="http://schemas.microsoft.com/office/drawing/2014/main" id="{ED598104-9FD6-499E-B00D-8819B504812B}"/>
+              </a:ext>
+            </a:extLst>
+          </p:cNvPr>
+          <p:cNvSpPr txBox="1"/>
+          <p:nvPr/>
+        </p:nvSpPr>
+        <p:spPr>
+          <a:xfrm>
+            <a:off x="10852535" y="7150596"/>
+            <a:ext cx="841897" cy="769441"/>
+          </a:xfrm>
+          <a:prstGeom prst="rect">
+            <a:avLst/>
+          </a:prstGeom>
+          <a:noFill/>
+        </p:spPr>
+        <p:txBody>
+          <a:bodyPr wrap="none" rtlCol="0">
+            <a:spAutoFit/>
+          </a:bodyPr>
+          <a:lstStyle/>
+          <a:p>
+            <a:r>
+              <a:rPr lang="en-GB" sz="4400" dirty="0">
+                <a:latin typeface="Times New Roman" panose="02020603050405020304" pitchFamily="18" charset="0"/>
+                <a:cs typeface="Times New Roman" panose="02020603050405020304" pitchFamily="18" charset="0"/>
+              </a:rPr>
+              <a:t>(b)</a:t>
+            </a:r>
+          </a:p>
+        </p:txBody>
+      </p:sp>
+      <p:sp>
+        <p:nvSpPr>
+          <p:cNvPr id="11" name="TextBox 10">
+            <a:extLst>
+              <a:ext uri="{FF2B5EF4-FFF2-40B4-BE49-F238E27FC236}">
+                <a16:creationId xmlns:a16="http://schemas.microsoft.com/office/drawing/2014/main" id="{8C12957B-7C04-48FB-BA7C-C3AAB210A50D}"/>
+              </a:ext>
+            </a:extLst>
+          </p:cNvPr>
+          <p:cNvSpPr txBox="1"/>
+          <p:nvPr/>
+        </p:nvSpPr>
+        <p:spPr>
+          <a:xfrm>
+            <a:off x="17946751" y="7150597"/>
+            <a:ext cx="809837" cy="769441"/>
+          </a:xfrm>
+          <a:prstGeom prst="rect">
+            <a:avLst/>
+          </a:prstGeom>
+          <a:noFill/>
+        </p:spPr>
+        <p:txBody>
+          <a:bodyPr wrap="none" rtlCol="0">
+            <a:spAutoFit/>
+          </a:bodyPr>
+          <a:lstStyle/>
+          <a:p>
+            <a:r>
+              <a:rPr lang="en-GB" sz="4400" dirty="0">
+                <a:latin typeface="Times New Roman" panose="02020603050405020304" pitchFamily="18" charset="0"/>
+                <a:cs typeface="Times New Roman" panose="02020603050405020304" pitchFamily="18" charset="0"/>
+              </a:rPr>
+              <a:t>(c)</a:t>
+            </a:r>
           </a:p>
         </p:txBody>
       </p:sp>
@@ -7645,12 +7753,12 @@
 <file path=ppt/theme/theme1.xml><?xml version="1.0" encoding="utf-8"?>
 <a:theme xmlns:a="http://schemas.openxmlformats.org/drawingml/2006/main" name="Office Theme">
   <a:themeElements>
-    <a:clrScheme name="LAG color scheme">
+    <a:clrScheme name="LAG Color Scheme">
       <a:dk1>
         <a:srgbClr val="4C4C4C"/>
       </a:dk1>
       <a:lt1>
-        <a:srgbClr val="FFFFFF"/>
+        <a:sysClr val="window" lastClr="FFFFFF"/>
       </a:lt1>
       <a:dk2>
         <a:srgbClr val="44546A"/>

</xml_diff>